<commit_message>
Presentation add ROC PR AUC
</commit_message>
<xml_diff>
--- a/Drug-Target Interaction Prediction.pptx
+++ b/Drug-Target Interaction Prediction.pptx
@@ -5,10 +5,10 @@
     <p:sldMasterId id="2147483887" r:id="rId4"/>
   </p:sldMasterIdLst>
   <p:notesMasterIdLst>
-    <p:notesMasterId r:id="rId34"/>
+    <p:notesMasterId r:id="rId36"/>
   </p:notesMasterIdLst>
   <p:handoutMasterIdLst>
-    <p:handoutMasterId r:id="rId35"/>
+    <p:handoutMasterId r:id="rId37"/>
   </p:handoutMasterIdLst>
   <p:sldIdLst>
     <p:sldId id="264" r:id="rId5"/>
@@ -34,12 +34,14 @@
     <p:sldId id="314" r:id="rId25"/>
     <p:sldId id="315" r:id="rId26"/>
     <p:sldId id="316" r:id="rId27"/>
-    <p:sldId id="317" r:id="rId28"/>
-    <p:sldId id="318" r:id="rId29"/>
-    <p:sldId id="319" r:id="rId30"/>
-    <p:sldId id="294" r:id="rId31"/>
-    <p:sldId id="289" r:id="rId32"/>
-    <p:sldId id="292" r:id="rId33"/>
+    <p:sldId id="320" r:id="rId28"/>
+    <p:sldId id="321" r:id="rId29"/>
+    <p:sldId id="317" r:id="rId30"/>
+    <p:sldId id="318" r:id="rId31"/>
+    <p:sldId id="319" r:id="rId32"/>
+    <p:sldId id="294" r:id="rId33"/>
+    <p:sldId id="289" r:id="rId34"/>
+    <p:sldId id="292" r:id="rId35"/>
   </p:sldIdLst>
   <p:sldSz cx="12188825" cy="6858000"/>
   <p:notesSz cx="6858000" cy="9144000"/>
@@ -26875,6 +26877,961 @@
           <a:lstStyle/>
           <a:p>
             <a:r>
+              <a:rPr lang="en-US" altLang="zh-CN" sz="3600" dirty="0">
+                <a:latin typeface="Calibri" panose="020F0502020204030204" pitchFamily="34" charset="0"/>
+                <a:cs typeface="Calibri" panose="020F0502020204030204" pitchFamily="34" charset="0"/>
+              </a:rPr>
+              <a:t>ROC curve and PR curve</a:t>
+            </a:r>
+            <a:endParaRPr lang="en-US" dirty="0">
+              <a:latin typeface="Calibri" panose="020F0502020204030204" pitchFamily="34" charset="0"/>
+              <a:cs typeface="Calibri" panose="020F0502020204030204" pitchFamily="34" charset="0"/>
+            </a:endParaRPr>
+          </a:p>
+        </p:txBody>
+      </p:sp>
+      <p:sp>
+        <p:nvSpPr>
+          <p:cNvPr id="9" name="Content Placeholder 8">
+            <a:extLst>
+              <a:ext uri="{FF2B5EF4-FFF2-40B4-BE49-F238E27FC236}">
+                <a16:creationId xmlns:a16="http://schemas.microsoft.com/office/drawing/2014/main" id="{BFD27979-805A-4B4B-946D-AB44BEAC7A32}"/>
+              </a:ext>
+            </a:extLst>
+          </p:cNvPr>
+          <p:cNvSpPr>
+            <a:spLocks noGrp="1"/>
+          </p:cNvSpPr>
+          <p:nvPr>
+            <p:ph idx="1"/>
+          </p:nvPr>
+        </p:nvSpPr>
+        <p:spPr>
+          <a:xfrm>
+            <a:off x="760413" y="1600200"/>
+            <a:ext cx="6553199" cy="4724400"/>
+          </a:xfrm>
+        </p:spPr>
+        <p:txBody>
+          <a:bodyPr>
+            <a:normAutofit/>
+          </a:bodyPr>
+          <a:lstStyle/>
+          <a:p>
+            <a:pPr marL="0" indent="0">
+              <a:buNone/>
+            </a:pPr>
+            <a:r>
+              <a:rPr lang="en-US">
+                <a:solidFill>
+                  <a:schemeClr val="tx1"/>
+                </a:solidFill>
+                <a:latin typeface="Calibri" panose="020F0502020204030204" pitchFamily="34" charset="0"/>
+                <a:cs typeface="Calibri" panose="020F0502020204030204" pitchFamily="34" charset="0"/>
+              </a:rPr>
+              <a:t>Confusion Matrix</a:t>
+            </a:r>
+            <a:endParaRPr lang="en-US" dirty="0">
+              <a:solidFill>
+                <a:schemeClr val="tx1"/>
+              </a:solidFill>
+              <a:latin typeface="Calibri" panose="020F0502020204030204" pitchFamily="34" charset="0"/>
+              <a:cs typeface="Calibri" panose="020F0502020204030204" pitchFamily="34" charset="0"/>
+            </a:endParaRPr>
+          </a:p>
+        </p:txBody>
+      </p:sp>
+      <p:sp>
+        <p:nvSpPr>
+          <p:cNvPr id="6" name="Content Placeholder 2">
+            <a:extLst>
+              <a:ext uri="{FF2B5EF4-FFF2-40B4-BE49-F238E27FC236}">
+                <a16:creationId xmlns:a16="http://schemas.microsoft.com/office/drawing/2014/main" id="{109EE1EC-0CF3-44EA-8406-9B48EE9C5C3D}"/>
+              </a:ext>
+            </a:extLst>
+          </p:cNvPr>
+          <p:cNvSpPr txBox="1">
+            <a:spLocks/>
+          </p:cNvSpPr>
+          <p:nvPr/>
+        </p:nvSpPr>
+        <p:spPr>
+          <a:xfrm>
+            <a:off x="637470" y="1676399"/>
+            <a:ext cx="9227254" cy="4343400"/>
+          </a:xfrm>
+          <a:prstGeom prst="rect">
+            <a:avLst/>
+          </a:prstGeom>
+        </p:spPr>
+        <p:txBody>
+          <a:bodyPr vert="horz" lIns="91440" tIns="45720" rIns="91440" bIns="45720" rtlCol="0">
+            <a:normAutofit/>
+          </a:bodyPr>
+          <a:lstStyle>
+            <a:lvl1pPr marL="342797" indent="-342797" algn="l" defTabSz="457063" rtl="0" eaLnBrk="1" latinLnBrk="0" hangingPunct="1">
+              <a:spcBef>
+                <a:spcPts val="1000"/>
+              </a:spcBef>
+              <a:spcAft>
+                <a:spcPts val="0"/>
+              </a:spcAft>
+              <a:buClr>
+                <a:schemeClr val="accent1"/>
+              </a:buClr>
+              <a:buSzPct val="80000"/>
+              <a:buFont typeface="Wingdings 3" charset="2"/>
+              <a:buChar char=""/>
+              <a:defRPr sz="1799" kern="1200">
+                <a:solidFill>
+                  <a:schemeClr val="tx1">
+                    <a:lumMod val="75000"/>
+                    <a:lumOff val="25000"/>
+                  </a:schemeClr>
+                </a:solidFill>
+                <a:latin typeface="+mn-lt"/>
+                <a:ea typeface="+mn-ea"/>
+                <a:cs typeface="+mn-cs"/>
+              </a:defRPr>
+            </a:lvl1pPr>
+            <a:lvl2pPr marL="742727" indent="-285664" algn="l" defTabSz="457063" rtl="0" eaLnBrk="1" latinLnBrk="0" hangingPunct="1">
+              <a:spcBef>
+                <a:spcPts val="1000"/>
+              </a:spcBef>
+              <a:spcAft>
+                <a:spcPts val="0"/>
+              </a:spcAft>
+              <a:buClr>
+                <a:schemeClr val="accent1"/>
+              </a:buClr>
+              <a:buSzPct val="80000"/>
+              <a:buFont typeface="Wingdings 3" charset="2"/>
+              <a:buChar char=""/>
+              <a:defRPr sz="1600" kern="1200">
+                <a:solidFill>
+                  <a:schemeClr val="tx1">
+                    <a:lumMod val="75000"/>
+                    <a:lumOff val="25000"/>
+                  </a:schemeClr>
+                </a:solidFill>
+                <a:latin typeface="+mn-lt"/>
+                <a:ea typeface="+mn-ea"/>
+                <a:cs typeface="+mn-cs"/>
+              </a:defRPr>
+            </a:lvl2pPr>
+            <a:lvl3pPr marL="1142657" indent="-228531" algn="l" defTabSz="457063" rtl="0" eaLnBrk="1" latinLnBrk="0" hangingPunct="1">
+              <a:spcBef>
+                <a:spcPts val="1000"/>
+              </a:spcBef>
+              <a:spcAft>
+                <a:spcPts val="0"/>
+              </a:spcAft>
+              <a:buClr>
+                <a:schemeClr val="accent1"/>
+              </a:buClr>
+              <a:buSzPct val="80000"/>
+              <a:buFont typeface="Wingdings 3" charset="2"/>
+              <a:buChar char=""/>
+              <a:defRPr sz="1400" kern="1200">
+                <a:solidFill>
+                  <a:schemeClr val="tx1">
+                    <a:lumMod val="75000"/>
+                    <a:lumOff val="25000"/>
+                  </a:schemeClr>
+                </a:solidFill>
+                <a:latin typeface="+mn-lt"/>
+                <a:ea typeface="+mn-ea"/>
+                <a:cs typeface="+mn-cs"/>
+              </a:defRPr>
+            </a:lvl3pPr>
+            <a:lvl4pPr marL="1599720" indent="-228531" algn="l" defTabSz="457063" rtl="0" eaLnBrk="1" latinLnBrk="0" hangingPunct="1">
+              <a:spcBef>
+                <a:spcPts val="1000"/>
+              </a:spcBef>
+              <a:spcAft>
+                <a:spcPts val="0"/>
+              </a:spcAft>
+              <a:buClr>
+                <a:schemeClr val="accent1"/>
+              </a:buClr>
+              <a:buSzPct val="80000"/>
+              <a:buFont typeface="Wingdings 3" charset="2"/>
+              <a:buChar char=""/>
+              <a:defRPr sz="1200" kern="1200">
+                <a:solidFill>
+                  <a:schemeClr val="tx1">
+                    <a:lumMod val="75000"/>
+                    <a:lumOff val="25000"/>
+                  </a:schemeClr>
+                </a:solidFill>
+                <a:latin typeface="+mn-lt"/>
+                <a:ea typeface="+mn-ea"/>
+                <a:cs typeface="+mn-cs"/>
+              </a:defRPr>
+            </a:lvl4pPr>
+            <a:lvl5pPr marL="2056783" indent="-228531" algn="l" defTabSz="457063" rtl="0" eaLnBrk="1" latinLnBrk="0" hangingPunct="1">
+              <a:spcBef>
+                <a:spcPts val="1000"/>
+              </a:spcBef>
+              <a:spcAft>
+                <a:spcPts val="0"/>
+              </a:spcAft>
+              <a:buClr>
+                <a:schemeClr val="accent1"/>
+              </a:buClr>
+              <a:buSzPct val="80000"/>
+              <a:buFont typeface="Wingdings 3" charset="2"/>
+              <a:buChar char=""/>
+              <a:defRPr sz="1200" kern="1200">
+                <a:solidFill>
+                  <a:schemeClr val="tx1">
+                    <a:lumMod val="75000"/>
+                    <a:lumOff val="25000"/>
+                  </a:schemeClr>
+                </a:solidFill>
+                <a:latin typeface="+mn-lt"/>
+                <a:ea typeface="+mn-ea"/>
+                <a:cs typeface="+mn-cs"/>
+              </a:defRPr>
+            </a:lvl5pPr>
+            <a:lvl6pPr marL="2513846" indent="-228531" algn="l" defTabSz="457063" rtl="0" eaLnBrk="1" latinLnBrk="0" hangingPunct="1">
+              <a:spcBef>
+                <a:spcPts val="1000"/>
+              </a:spcBef>
+              <a:spcAft>
+                <a:spcPts val="0"/>
+              </a:spcAft>
+              <a:buClr>
+                <a:schemeClr val="accent1"/>
+              </a:buClr>
+              <a:buSzPct val="80000"/>
+              <a:buFont typeface="Wingdings 3" charset="2"/>
+              <a:buChar char=""/>
+              <a:defRPr sz="1200" kern="1200">
+                <a:solidFill>
+                  <a:schemeClr val="tx1">
+                    <a:lumMod val="75000"/>
+                    <a:lumOff val="25000"/>
+                  </a:schemeClr>
+                </a:solidFill>
+                <a:latin typeface="+mn-lt"/>
+                <a:ea typeface="+mn-ea"/>
+                <a:cs typeface="+mn-cs"/>
+              </a:defRPr>
+            </a:lvl6pPr>
+            <a:lvl7pPr marL="2970908" indent="-228531" algn="l" defTabSz="457063" rtl="0" eaLnBrk="1" latinLnBrk="0" hangingPunct="1">
+              <a:spcBef>
+                <a:spcPts val="1000"/>
+              </a:spcBef>
+              <a:spcAft>
+                <a:spcPts val="0"/>
+              </a:spcAft>
+              <a:buClr>
+                <a:schemeClr val="accent1"/>
+              </a:buClr>
+              <a:buSzPct val="80000"/>
+              <a:buFont typeface="Wingdings 3" charset="2"/>
+              <a:buChar char=""/>
+              <a:defRPr sz="1200" kern="1200">
+                <a:solidFill>
+                  <a:schemeClr val="tx1">
+                    <a:lumMod val="75000"/>
+                    <a:lumOff val="25000"/>
+                  </a:schemeClr>
+                </a:solidFill>
+                <a:latin typeface="+mn-lt"/>
+                <a:ea typeface="+mn-ea"/>
+                <a:cs typeface="+mn-cs"/>
+              </a:defRPr>
+            </a:lvl7pPr>
+            <a:lvl8pPr marL="3427971" indent="-228531" algn="l" defTabSz="457063" rtl="0" eaLnBrk="1" latinLnBrk="0" hangingPunct="1">
+              <a:spcBef>
+                <a:spcPts val="1000"/>
+              </a:spcBef>
+              <a:spcAft>
+                <a:spcPts val="0"/>
+              </a:spcAft>
+              <a:buClr>
+                <a:schemeClr val="accent1"/>
+              </a:buClr>
+              <a:buSzPct val="80000"/>
+              <a:buFont typeface="Wingdings 3" charset="2"/>
+              <a:buChar char=""/>
+              <a:defRPr sz="1200" kern="1200">
+                <a:solidFill>
+                  <a:schemeClr val="tx1">
+                    <a:lumMod val="75000"/>
+                    <a:lumOff val="25000"/>
+                  </a:schemeClr>
+                </a:solidFill>
+                <a:latin typeface="+mn-lt"/>
+                <a:ea typeface="+mn-ea"/>
+                <a:cs typeface="+mn-cs"/>
+              </a:defRPr>
+            </a:lvl8pPr>
+            <a:lvl9pPr marL="3885034" indent="-228531" algn="l" defTabSz="457063" rtl="0" eaLnBrk="1" latinLnBrk="0" hangingPunct="1">
+              <a:spcBef>
+                <a:spcPts val="1000"/>
+              </a:spcBef>
+              <a:spcAft>
+                <a:spcPts val="0"/>
+              </a:spcAft>
+              <a:buClr>
+                <a:schemeClr val="accent1"/>
+              </a:buClr>
+              <a:buSzPct val="80000"/>
+              <a:buFont typeface="Wingdings 3" charset="2"/>
+              <a:buChar char=""/>
+              <a:defRPr sz="1200" kern="1200">
+                <a:solidFill>
+                  <a:schemeClr val="tx1">
+                    <a:lumMod val="75000"/>
+                    <a:lumOff val="25000"/>
+                  </a:schemeClr>
+                </a:solidFill>
+                <a:latin typeface="+mn-lt"/>
+                <a:ea typeface="+mn-ea"/>
+                <a:cs typeface="+mn-cs"/>
+              </a:defRPr>
+            </a:lvl9pPr>
+          </a:lstStyle>
+          <a:p>
+            <a:pPr marL="457063" lvl="1" indent="0">
+              <a:buFont typeface="Wingdings 3" charset="2"/>
+              <a:buNone/>
+            </a:pPr>
+            <a:endParaRPr lang="en-US" dirty="0"/>
+          </a:p>
+        </p:txBody>
+      </p:sp>
+      <p:pic>
+        <p:nvPicPr>
+          <p:cNvPr id="8" name="图片 7" descr="æ··æ·ç©éµ">
+            <a:extLst>
+              <a:ext uri="{FF2B5EF4-FFF2-40B4-BE49-F238E27FC236}">
+                <a16:creationId xmlns:a16="http://schemas.microsoft.com/office/drawing/2014/main" id="{3FE636F5-DD59-4D68-B488-95FB3776164C}"/>
+              </a:ext>
+            </a:extLst>
+          </p:cNvPr>
+          <p:cNvPicPr/>
+          <p:nvPr/>
+        </p:nvPicPr>
+        <p:blipFill rotWithShape="1">
+          <a:blip r:embed="rId2" cstate="print">
+            <a:extLst>
+              <a:ext uri="{28A0092B-C50C-407E-A947-70E740481C1C}">
+                <a14:useLocalDpi xmlns:a14="http://schemas.microsoft.com/office/drawing/2010/main" val="0"/>
+              </a:ext>
+            </a:extLst>
+          </a:blip>
+          <a:srcRect b="13462"/>
+          <a:stretch/>
+        </p:blipFill>
+        <p:spPr bwMode="auto">
+          <a:xfrm>
+            <a:off x="637470" y="2209800"/>
+            <a:ext cx="8504942" cy="3429000"/>
+          </a:xfrm>
+          <a:prstGeom prst="rect">
+            <a:avLst/>
+          </a:prstGeom>
+          <a:noFill/>
+          <a:ln>
+            <a:noFill/>
+          </a:ln>
+        </p:spPr>
+      </p:pic>
+    </p:spTree>
+    <p:extLst>
+      <p:ext uri="{BB962C8B-B14F-4D97-AF65-F5344CB8AC3E}">
+        <p14:creationId xmlns:p14="http://schemas.microsoft.com/office/powerpoint/2010/main" val="1803902446"/>
+      </p:ext>
+    </p:extLst>
+  </p:cSld>
+  <p:clrMapOvr>
+    <a:masterClrMapping/>
+  </p:clrMapOvr>
+  <mc:AlternateContent xmlns:mc="http://schemas.openxmlformats.org/markup-compatibility/2006" xmlns:p14="http://schemas.microsoft.com/office/powerpoint/2010/main">
+    <mc:Choice Requires="p14">
+      <p:transition spd="med" p14:dur="700">
+        <p:fade/>
+      </p:transition>
+    </mc:Choice>
+    <mc:Fallback xmlns="">
+      <p:transition spd="med">
+        <p:fade/>
+      </p:transition>
+    </mc:Fallback>
+  </mc:AlternateContent>
+</p:sld>
+</file>
+
+<file path=ppt/slides/slide25.xml><?xml version="1.0" encoding="utf-8"?>
+<p:sld xmlns:a="http://schemas.openxmlformats.org/drawingml/2006/main" xmlns:r="http://schemas.openxmlformats.org/officeDocument/2006/relationships" xmlns:p="http://schemas.openxmlformats.org/presentationml/2006/main">
+  <p:cSld>
+    <p:spTree>
+      <p:nvGrpSpPr>
+        <p:cNvPr id="1" name=""/>
+        <p:cNvGrpSpPr/>
+        <p:nvPr/>
+      </p:nvGrpSpPr>
+      <p:grpSpPr>
+        <a:xfrm>
+          <a:off x="0" y="0"/>
+          <a:ext cx="0" cy="0"/>
+          <a:chOff x="0" y="0"/>
+          <a:chExt cx="0" cy="0"/>
+        </a:xfrm>
+      </p:grpSpPr>
+      <p:sp>
+        <p:nvSpPr>
+          <p:cNvPr id="2" name="Title 1"/>
+          <p:cNvSpPr>
+            <a:spLocks noGrp="1"/>
+          </p:cNvSpPr>
+          <p:nvPr>
+            <p:ph type="title"/>
+          </p:nvPr>
+        </p:nvSpPr>
+        <p:spPr/>
+        <p:txBody>
+          <a:bodyPr anchor="t">
+            <a:normAutofit/>
+          </a:bodyPr>
+          <a:lstStyle/>
+          <a:p>
+            <a:r>
+              <a:rPr lang="en-US" altLang="zh-CN" sz="3600" dirty="0">
+                <a:latin typeface="Calibri" panose="020F0502020204030204" pitchFamily="34" charset="0"/>
+                <a:cs typeface="Calibri" panose="020F0502020204030204" pitchFamily="34" charset="0"/>
+              </a:rPr>
+              <a:t>ROC curve and PR curve (Cont.) </a:t>
+            </a:r>
+            <a:endParaRPr lang="en-US" dirty="0">
+              <a:latin typeface="Calibri" panose="020F0502020204030204" pitchFamily="34" charset="0"/>
+              <a:cs typeface="Calibri" panose="020F0502020204030204" pitchFamily="34" charset="0"/>
+            </a:endParaRPr>
+          </a:p>
+        </p:txBody>
+      </p:sp>
+      <p:sp>
+        <p:nvSpPr>
+          <p:cNvPr id="9" name="Content Placeholder 8">
+            <a:extLst>
+              <a:ext uri="{FF2B5EF4-FFF2-40B4-BE49-F238E27FC236}">
+                <a16:creationId xmlns:a16="http://schemas.microsoft.com/office/drawing/2014/main" id="{BFD27979-805A-4B4B-946D-AB44BEAC7A32}"/>
+              </a:ext>
+            </a:extLst>
+          </p:cNvPr>
+          <p:cNvSpPr>
+            <a:spLocks noGrp="1"/>
+          </p:cNvSpPr>
+          <p:nvPr>
+            <p:ph idx="1"/>
+          </p:nvPr>
+        </p:nvSpPr>
+        <p:spPr>
+          <a:xfrm>
+            <a:off x="760413" y="1600200"/>
+            <a:ext cx="6553199" cy="4724400"/>
+          </a:xfrm>
+        </p:spPr>
+        <p:txBody>
+          <a:bodyPr>
+            <a:normAutofit/>
+          </a:bodyPr>
+          <a:lstStyle/>
+          <a:p>
+            <a:pPr marL="0" indent="0">
+              <a:buNone/>
+            </a:pPr>
+            <a:r>
+              <a:rPr lang="en-US" dirty="0">
+                <a:solidFill>
+                  <a:schemeClr val="tx1"/>
+                </a:solidFill>
+                <a:latin typeface="Calibri" panose="020F0502020204030204" pitchFamily="34" charset="0"/>
+                <a:cs typeface="Calibri" panose="020F0502020204030204" pitchFamily="34" charset="0"/>
+              </a:rPr>
+              <a:t>ROC curve: Y, true positive rate. X, </a:t>
+            </a:r>
+            <a:r>
+              <a:rPr lang="en-US" altLang="zh-CN" dirty="0"/>
+              <a:t>false positive rate.</a:t>
+            </a:r>
+          </a:p>
+          <a:p>
+            <a:pPr marL="0" indent="0">
+              <a:buNone/>
+            </a:pPr>
+            <a:r>
+              <a:rPr lang="en-US" dirty="0">
+                <a:solidFill>
+                  <a:schemeClr val="tx1"/>
+                </a:solidFill>
+                <a:latin typeface="Calibri" panose="020F0502020204030204" pitchFamily="34" charset="0"/>
+                <a:cs typeface="Calibri" panose="020F0502020204030204" pitchFamily="34" charset="0"/>
+              </a:rPr>
+              <a:t>Convex to the upper left will be better.</a:t>
+            </a:r>
+          </a:p>
+          <a:p>
+            <a:pPr marL="0" indent="0">
+              <a:buNone/>
+            </a:pPr>
+            <a:endParaRPr lang="en-US" dirty="0">
+              <a:solidFill>
+                <a:schemeClr val="tx1"/>
+              </a:solidFill>
+              <a:latin typeface="Calibri" panose="020F0502020204030204" pitchFamily="34" charset="0"/>
+              <a:cs typeface="Calibri" panose="020F0502020204030204" pitchFamily="34" charset="0"/>
+            </a:endParaRPr>
+          </a:p>
+          <a:p>
+            <a:pPr marL="0" indent="0">
+              <a:buNone/>
+            </a:pPr>
+            <a:r>
+              <a:rPr lang="en-US" dirty="0">
+                <a:solidFill>
+                  <a:schemeClr val="tx1"/>
+                </a:solidFill>
+                <a:latin typeface="Calibri" panose="020F0502020204030204" pitchFamily="34" charset="0"/>
+                <a:cs typeface="Calibri" panose="020F0502020204030204" pitchFamily="34" charset="0"/>
+              </a:rPr>
+              <a:t>PR curve: Y, precision. X, recall.</a:t>
+            </a:r>
+          </a:p>
+          <a:p>
+            <a:pPr marL="0" indent="0">
+              <a:buNone/>
+            </a:pPr>
+            <a:r>
+              <a:rPr lang="en-US" altLang="zh-CN" dirty="0">
+                <a:solidFill>
+                  <a:schemeClr val="tx1"/>
+                </a:solidFill>
+                <a:latin typeface="Calibri" panose="020F0502020204030204" pitchFamily="34" charset="0"/>
+                <a:cs typeface="Calibri" panose="020F0502020204030204" pitchFamily="34" charset="0"/>
+              </a:rPr>
+              <a:t>Convex to the upper right will be better.</a:t>
+            </a:r>
+          </a:p>
+          <a:p>
+            <a:pPr marL="0" indent="0">
+              <a:buNone/>
+            </a:pPr>
+            <a:endParaRPr lang="en-US" dirty="0">
+              <a:solidFill>
+                <a:schemeClr val="tx1"/>
+              </a:solidFill>
+              <a:latin typeface="Calibri" panose="020F0502020204030204" pitchFamily="34" charset="0"/>
+              <a:cs typeface="Calibri" panose="020F0502020204030204" pitchFamily="34" charset="0"/>
+            </a:endParaRPr>
+          </a:p>
+          <a:p>
+            <a:pPr marL="0" indent="0">
+              <a:buNone/>
+            </a:pPr>
+            <a:r>
+              <a:rPr lang="en-US" dirty="0">
+                <a:solidFill>
+                  <a:schemeClr val="tx1"/>
+                </a:solidFill>
+                <a:latin typeface="Calibri" panose="020F0502020204030204" pitchFamily="34" charset="0"/>
+                <a:cs typeface="Calibri" panose="020F0502020204030204" pitchFamily="34" charset="0"/>
+              </a:rPr>
+              <a:t>How to get each point: let each predicted score be the threshold, then we calculate X and Y value.</a:t>
+            </a:r>
+          </a:p>
+          <a:p>
+            <a:pPr marL="0" indent="0">
+              <a:buNone/>
+            </a:pPr>
+            <a:endParaRPr lang="en-US" dirty="0">
+              <a:solidFill>
+                <a:schemeClr val="tx1"/>
+              </a:solidFill>
+              <a:latin typeface="Calibri" panose="020F0502020204030204" pitchFamily="34" charset="0"/>
+              <a:cs typeface="Calibri" panose="020F0502020204030204" pitchFamily="34" charset="0"/>
+            </a:endParaRPr>
+          </a:p>
+          <a:p>
+            <a:pPr marL="0" indent="0">
+              <a:buNone/>
+            </a:pPr>
+            <a:r>
+              <a:rPr lang="en-US" altLang="zh-CN" dirty="0"/>
+              <a:t> AUC (area under the curve)</a:t>
+            </a:r>
+          </a:p>
+          <a:p>
+            <a:pPr marL="0" indent="0">
+              <a:buNone/>
+            </a:pPr>
+            <a:r>
+              <a:rPr lang="en-US" altLang="zh-CN" dirty="0">
+                <a:solidFill>
+                  <a:schemeClr val="tx1"/>
+                </a:solidFill>
+                <a:latin typeface="Calibri" panose="020F0502020204030204" pitchFamily="34" charset="0"/>
+                <a:cs typeface="Calibri" panose="020F0502020204030204" pitchFamily="34" charset="0"/>
+              </a:rPr>
+              <a:t>The curve can be ROC or PR.</a:t>
+            </a:r>
+          </a:p>
+          <a:p>
+            <a:pPr marL="0" indent="0">
+              <a:buNone/>
+            </a:pPr>
+            <a:r>
+              <a:rPr lang="en-US" altLang="zh-CN" dirty="0">
+                <a:solidFill>
+                  <a:schemeClr val="tx1"/>
+                </a:solidFill>
+                <a:latin typeface="Calibri" panose="020F0502020204030204" pitchFamily="34" charset="0"/>
+                <a:cs typeface="Calibri" panose="020F0502020204030204" pitchFamily="34" charset="0"/>
+              </a:rPr>
+              <a:t>The value close to 1 will be better.</a:t>
+            </a:r>
+          </a:p>
+          <a:p>
+            <a:pPr marL="0" indent="0">
+              <a:buNone/>
+            </a:pPr>
+            <a:endParaRPr lang="en-US" dirty="0">
+              <a:solidFill>
+                <a:schemeClr val="tx1"/>
+              </a:solidFill>
+              <a:latin typeface="Calibri" panose="020F0502020204030204" pitchFamily="34" charset="0"/>
+              <a:cs typeface="Calibri" panose="020F0502020204030204" pitchFamily="34" charset="0"/>
+            </a:endParaRPr>
+          </a:p>
+        </p:txBody>
+      </p:sp>
+      <p:sp>
+        <p:nvSpPr>
+          <p:cNvPr id="6" name="Content Placeholder 2">
+            <a:extLst>
+              <a:ext uri="{FF2B5EF4-FFF2-40B4-BE49-F238E27FC236}">
+                <a16:creationId xmlns:a16="http://schemas.microsoft.com/office/drawing/2014/main" id="{109EE1EC-0CF3-44EA-8406-9B48EE9C5C3D}"/>
+              </a:ext>
+            </a:extLst>
+          </p:cNvPr>
+          <p:cNvSpPr txBox="1">
+            <a:spLocks/>
+          </p:cNvSpPr>
+          <p:nvPr/>
+        </p:nvSpPr>
+        <p:spPr>
+          <a:xfrm>
+            <a:off x="637470" y="1676399"/>
+            <a:ext cx="9227254" cy="4343400"/>
+          </a:xfrm>
+          <a:prstGeom prst="rect">
+            <a:avLst/>
+          </a:prstGeom>
+        </p:spPr>
+        <p:txBody>
+          <a:bodyPr vert="horz" lIns="91440" tIns="45720" rIns="91440" bIns="45720" rtlCol="0">
+            <a:normAutofit/>
+          </a:bodyPr>
+          <a:lstStyle>
+            <a:lvl1pPr marL="342797" indent="-342797" algn="l" defTabSz="457063" rtl="0" eaLnBrk="1" latinLnBrk="0" hangingPunct="1">
+              <a:spcBef>
+                <a:spcPts val="1000"/>
+              </a:spcBef>
+              <a:spcAft>
+                <a:spcPts val="0"/>
+              </a:spcAft>
+              <a:buClr>
+                <a:schemeClr val="accent1"/>
+              </a:buClr>
+              <a:buSzPct val="80000"/>
+              <a:buFont typeface="Wingdings 3" charset="2"/>
+              <a:buChar char=""/>
+              <a:defRPr sz="1799" kern="1200">
+                <a:solidFill>
+                  <a:schemeClr val="tx1">
+                    <a:lumMod val="75000"/>
+                    <a:lumOff val="25000"/>
+                  </a:schemeClr>
+                </a:solidFill>
+                <a:latin typeface="+mn-lt"/>
+                <a:ea typeface="+mn-ea"/>
+                <a:cs typeface="+mn-cs"/>
+              </a:defRPr>
+            </a:lvl1pPr>
+            <a:lvl2pPr marL="742727" indent="-285664" algn="l" defTabSz="457063" rtl="0" eaLnBrk="1" latinLnBrk="0" hangingPunct="1">
+              <a:spcBef>
+                <a:spcPts val="1000"/>
+              </a:spcBef>
+              <a:spcAft>
+                <a:spcPts val="0"/>
+              </a:spcAft>
+              <a:buClr>
+                <a:schemeClr val="accent1"/>
+              </a:buClr>
+              <a:buSzPct val="80000"/>
+              <a:buFont typeface="Wingdings 3" charset="2"/>
+              <a:buChar char=""/>
+              <a:defRPr sz="1600" kern="1200">
+                <a:solidFill>
+                  <a:schemeClr val="tx1">
+                    <a:lumMod val="75000"/>
+                    <a:lumOff val="25000"/>
+                  </a:schemeClr>
+                </a:solidFill>
+                <a:latin typeface="+mn-lt"/>
+                <a:ea typeface="+mn-ea"/>
+                <a:cs typeface="+mn-cs"/>
+              </a:defRPr>
+            </a:lvl2pPr>
+            <a:lvl3pPr marL="1142657" indent="-228531" algn="l" defTabSz="457063" rtl="0" eaLnBrk="1" latinLnBrk="0" hangingPunct="1">
+              <a:spcBef>
+                <a:spcPts val="1000"/>
+              </a:spcBef>
+              <a:spcAft>
+                <a:spcPts val="0"/>
+              </a:spcAft>
+              <a:buClr>
+                <a:schemeClr val="accent1"/>
+              </a:buClr>
+              <a:buSzPct val="80000"/>
+              <a:buFont typeface="Wingdings 3" charset="2"/>
+              <a:buChar char=""/>
+              <a:defRPr sz="1400" kern="1200">
+                <a:solidFill>
+                  <a:schemeClr val="tx1">
+                    <a:lumMod val="75000"/>
+                    <a:lumOff val="25000"/>
+                  </a:schemeClr>
+                </a:solidFill>
+                <a:latin typeface="+mn-lt"/>
+                <a:ea typeface="+mn-ea"/>
+                <a:cs typeface="+mn-cs"/>
+              </a:defRPr>
+            </a:lvl3pPr>
+            <a:lvl4pPr marL="1599720" indent="-228531" algn="l" defTabSz="457063" rtl="0" eaLnBrk="1" latinLnBrk="0" hangingPunct="1">
+              <a:spcBef>
+                <a:spcPts val="1000"/>
+              </a:spcBef>
+              <a:spcAft>
+                <a:spcPts val="0"/>
+              </a:spcAft>
+              <a:buClr>
+                <a:schemeClr val="accent1"/>
+              </a:buClr>
+              <a:buSzPct val="80000"/>
+              <a:buFont typeface="Wingdings 3" charset="2"/>
+              <a:buChar char=""/>
+              <a:defRPr sz="1200" kern="1200">
+                <a:solidFill>
+                  <a:schemeClr val="tx1">
+                    <a:lumMod val="75000"/>
+                    <a:lumOff val="25000"/>
+                  </a:schemeClr>
+                </a:solidFill>
+                <a:latin typeface="+mn-lt"/>
+                <a:ea typeface="+mn-ea"/>
+                <a:cs typeface="+mn-cs"/>
+              </a:defRPr>
+            </a:lvl4pPr>
+            <a:lvl5pPr marL="2056783" indent="-228531" algn="l" defTabSz="457063" rtl="0" eaLnBrk="1" latinLnBrk="0" hangingPunct="1">
+              <a:spcBef>
+                <a:spcPts val="1000"/>
+              </a:spcBef>
+              <a:spcAft>
+                <a:spcPts val="0"/>
+              </a:spcAft>
+              <a:buClr>
+                <a:schemeClr val="accent1"/>
+              </a:buClr>
+              <a:buSzPct val="80000"/>
+              <a:buFont typeface="Wingdings 3" charset="2"/>
+              <a:buChar char=""/>
+              <a:defRPr sz="1200" kern="1200">
+                <a:solidFill>
+                  <a:schemeClr val="tx1">
+                    <a:lumMod val="75000"/>
+                    <a:lumOff val="25000"/>
+                  </a:schemeClr>
+                </a:solidFill>
+                <a:latin typeface="+mn-lt"/>
+                <a:ea typeface="+mn-ea"/>
+                <a:cs typeface="+mn-cs"/>
+              </a:defRPr>
+            </a:lvl5pPr>
+            <a:lvl6pPr marL="2513846" indent="-228531" algn="l" defTabSz="457063" rtl="0" eaLnBrk="1" latinLnBrk="0" hangingPunct="1">
+              <a:spcBef>
+                <a:spcPts val="1000"/>
+              </a:spcBef>
+              <a:spcAft>
+                <a:spcPts val="0"/>
+              </a:spcAft>
+              <a:buClr>
+                <a:schemeClr val="accent1"/>
+              </a:buClr>
+              <a:buSzPct val="80000"/>
+              <a:buFont typeface="Wingdings 3" charset="2"/>
+              <a:buChar char=""/>
+              <a:defRPr sz="1200" kern="1200">
+                <a:solidFill>
+                  <a:schemeClr val="tx1">
+                    <a:lumMod val="75000"/>
+                    <a:lumOff val="25000"/>
+                  </a:schemeClr>
+                </a:solidFill>
+                <a:latin typeface="+mn-lt"/>
+                <a:ea typeface="+mn-ea"/>
+                <a:cs typeface="+mn-cs"/>
+              </a:defRPr>
+            </a:lvl6pPr>
+            <a:lvl7pPr marL="2970908" indent="-228531" algn="l" defTabSz="457063" rtl="0" eaLnBrk="1" latinLnBrk="0" hangingPunct="1">
+              <a:spcBef>
+                <a:spcPts val="1000"/>
+              </a:spcBef>
+              <a:spcAft>
+                <a:spcPts val="0"/>
+              </a:spcAft>
+              <a:buClr>
+                <a:schemeClr val="accent1"/>
+              </a:buClr>
+              <a:buSzPct val="80000"/>
+              <a:buFont typeface="Wingdings 3" charset="2"/>
+              <a:buChar char=""/>
+              <a:defRPr sz="1200" kern="1200">
+                <a:solidFill>
+                  <a:schemeClr val="tx1">
+                    <a:lumMod val="75000"/>
+                    <a:lumOff val="25000"/>
+                  </a:schemeClr>
+                </a:solidFill>
+                <a:latin typeface="+mn-lt"/>
+                <a:ea typeface="+mn-ea"/>
+                <a:cs typeface="+mn-cs"/>
+              </a:defRPr>
+            </a:lvl7pPr>
+            <a:lvl8pPr marL="3427971" indent="-228531" algn="l" defTabSz="457063" rtl="0" eaLnBrk="1" latinLnBrk="0" hangingPunct="1">
+              <a:spcBef>
+                <a:spcPts val="1000"/>
+              </a:spcBef>
+              <a:spcAft>
+                <a:spcPts val="0"/>
+              </a:spcAft>
+              <a:buClr>
+                <a:schemeClr val="accent1"/>
+              </a:buClr>
+              <a:buSzPct val="80000"/>
+              <a:buFont typeface="Wingdings 3" charset="2"/>
+              <a:buChar char=""/>
+              <a:defRPr sz="1200" kern="1200">
+                <a:solidFill>
+                  <a:schemeClr val="tx1">
+                    <a:lumMod val="75000"/>
+                    <a:lumOff val="25000"/>
+                  </a:schemeClr>
+                </a:solidFill>
+                <a:latin typeface="+mn-lt"/>
+                <a:ea typeface="+mn-ea"/>
+                <a:cs typeface="+mn-cs"/>
+              </a:defRPr>
+            </a:lvl8pPr>
+            <a:lvl9pPr marL="3885034" indent="-228531" algn="l" defTabSz="457063" rtl="0" eaLnBrk="1" latinLnBrk="0" hangingPunct="1">
+              <a:spcBef>
+                <a:spcPts val="1000"/>
+              </a:spcBef>
+              <a:spcAft>
+                <a:spcPts val="0"/>
+              </a:spcAft>
+              <a:buClr>
+                <a:schemeClr val="accent1"/>
+              </a:buClr>
+              <a:buSzPct val="80000"/>
+              <a:buFont typeface="Wingdings 3" charset="2"/>
+              <a:buChar char=""/>
+              <a:defRPr sz="1200" kern="1200">
+                <a:solidFill>
+                  <a:schemeClr val="tx1">
+                    <a:lumMod val="75000"/>
+                    <a:lumOff val="25000"/>
+                  </a:schemeClr>
+                </a:solidFill>
+                <a:latin typeface="+mn-lt"/>
+                <a:ea typeface="+mn-ea"/>
+                <a:cs typeface="+mn-cs"/>
+              </a:defRPr>
+            </a:lvl9pPr>
+          </a:lstStyle>
+          <a:p>
+            <a:pPr marL="457063" lvl="1" indent="0">
+              <a:buFont typeface="Wingdings 3" charset="2"/>
+              <a:buNone/>
+            </a:pPr>
+            <a:endParaRPr lang="en-US" dirty="0"/>
+          </a:p>
+        </p:txBody>
+      </p:sp>
+    </p:spTree>
+    <p:extLst>
+      <p:ext uri="{BB962C8B-B14F-4D97-AF65-F5344CB8AC3E}">
+        <p14:creationId xmlns:p14="http://schemas.microsoft.com/office/powerpoint/2010/main" val="2810685299"/>
+      </p:ext>
+    </p:extLst>
+  </p:cSld>
+  <p:clrMapOvr>
+    <a:masterClrMapping/>
+  </p:clrMapOvr>
+  <mc:AlternateContent xmlns:mc="http://schemas.openxmlformats.org/markup-compatibility/2006" xmlns:p14="http://schemas.microsoft.com/office/powerpoint/2010/main">
+    <mc:Choice Requires="p14">
+      <p:transition spd="med" p14:dur="700">
+        <p:fade/>
+      </p:transition>
+    </mc:Choice>
+    <mc:Fallback xmlns="">
+      <p:transition spd="med">
+        <p:fade/>
+      </p:transition>
+    </mc:Fallback>
+  </mc:AlternateContent>
+</p:sld>
+</file>
+
+<file path=ppt/slides/slide26.xml><?xml version="1.0" encoding="utf-8"?>
+<p:sld xmlns:a="http://schemas.openxmlformats.org/drawingml/2006/main" xmlns:r="http://schemas.openxmlformats.org/officeDocument/2006/relationships" xmlns:p="http://schemas.openxmlformats.org/presentationml/2006/main">
+  <p:cSld>
+    <p:spTree>
+      <p:nvGrpSpPr>
+        <p:cNvPr id="1" name=""/>
+        <p:cNvGrpSpPr/>
+        <p:nvPr/>
+      </p:nvGrpSpPr>
+      <p:grpSpPr>
+        <a:xfrm>
+          <a:off x="0" y="0"/>
+          <a:ext cx="0" cy="0"/>
+          <a:chOff x="0" y="0"/>
+          <a:chExt cx="0" cy="0"/>
+        </a:xfrm>
+      </p:grpSpPr>
+      <p:sp>
+        <p:nvSpPr>
+          <p:cNvPr id="2" name="Title 1"/>
+          <p:cNvSpPr>
+            <a:spLocks noGrp="1"/>
+          </p:cNvSpPr>
+          <p:nvPr>
+            <p:ph type="title"/>
+          </p:nvPr>
+        </p:nvSpPr>
+        <p:spPr/>
+        <p:txBody>
+          <a:bodyPr anchor="t">
+            <a:normAutofit/>
+          </a:bodyPr>
+          <a:lstStyle/>
+          <a:p>
+            <a:r>
               <a:rPr lang="en-US" sz="3600" dirty="0">
                 <a:latin typeface="Calibri" panose="020F0502020204030204" pitchFamily="34" charset="0"/>
                 <a:cs typeface="Calibri" panose="020F0502020204030204" pitchFamily="34" charset="0"/>
@@ -28359,7 +29316,7 @@
 </p:sld>
 </file>
 
-<file path=ppt/slides/slide25.xml><?xml version="1.0" encoding="utf-8"?>
+<file path=ppt/slides/slide27.xml><?xml version="1.0" encoding="utf-8"?>
 <p:sld xmlns:a="http://schemas.openxmlformats.org/drawingml/2006/main" xmlns:r="http://schemas.openxmlformats.org/officeDocument/2006/relationships" xmlns:p="http://schemas.openxmlformats.org/presentationml/2006/main">
   <p:cSld>
     <p:spTree>
@@ -29990,7 +30947,7 @@
 </p:sld>
 </file>
 
-<file path=ppt/slides/slide26.xml><?xml version="1.0" encoding="utf-8"?>
+<file path=ppt/slides/slide28.xml><?xml version="1.0" encoding="utf-8"?>
 <p:sld xmlns:a="http://schemas.openxmlformats.org/drawingml/2006/main" xmlns:r="http://schemas.openxmlformats.org/officeDocument/2006/relationships" xmlns:p="http://schemas.openxmlformats.org/presentationml/2006/main">
   <p:cSld>
     <p:spTree>
@@ -31622,7 +32579,7 @@
 </p:sld>
 </file>
 
-<file path=ppt/slides/slide27.xml><?xml version="1.0" encoding="utf-8"?>
+<file path=ppt/slides/slide29.xml><?xml version="1.0" encoding="utf-8"?>
 <p:sld xmlns:a="http://schemas.openxmlformats.org/drawingml/2006/main" xmlns:r="http://schemas.openxmlformats.org/officeDocument/2006/relationships" xmlns:p="http://schemas.openxmlformats.org/presentationml/2006/main">
   <p:cSld>
     <p:bg>
@@ -32001,188 +32958,6 @@
 </p:sld>
 </file>
 
-<file path=ppt/slides/slide28.xml><?xml version="1.0" encoding="utf-8"?>
-<p:sld xmlns:a="http://schemas.openxmlformats.org/drawingml/2006/main" xmlns:r="http://schemas.openxmlformats.org/officeDocument/2006/relationships" xmlns:p="http://schemas.openxmlformats.org/presentationml/2006/main">
-  <p:cSld>
-    <p:spTree>
-      <p:nvGrpSpPr>
-        <p:cNvPr id="1" name=""/>
-        <p:cNvGrpSpPr/>
-        <p:nvPr/>
-      </p:nvGrpSpPr>
-      <p:grpSpPr>
-        <a:xfrm>
-          <a:off x="0" y="0"/>
-          <a:ext cx="0" cy="0"/>
-          <a:chOff x="0" y="0"/>
-          <a:chExt cx="0" cy="0"/>
-        </a:xfrm>
-      </p:grpSpPr>
-      <p:sp>
-        <p:nvSpPr>
-          <p:cNvPr id="5" name="Rectangle 4">
-            <a:extLst>
-              <a:ext uri="{FF2B5EF4-FFF2-40B4-BE49-F238E27FC236}">
-                <a16:creationId xmlns:a16="http://schemas.microsoft.com/office/drawing/2014/main" id="{86F37EA8-E346-44D3-9BCA-9003A76D1BAA}"/>
-              </a:ext>
-            </a:extLst>
-          </p:cNvPr>
-          <p:cNvSpPr/>
-          <p:nvPr/>
-        </p:nvSpPr>
-        <p:spPr>
-          <a:xfrm>
-            <a:off x="2208212" y="2644170"/>
-            <a:ext cx="7558498" cy="1569660"/>
-          </a:xfrm>
-          <a:prstGeom prst="rect">
-            <a:avLst/>
-          </a:prstGeom>
-        </p:spPr>
-        <p:txBody>
-          <a:bodyPr wrap="square">
-            <a:spAutoFit/>
-          </a:bodyPr>
-          <a:lstStyle/>
-          <a:p>
-            <a:r>
-              <a:rPr lang="en-US" sz="9600" dirty="0">
-                <a:solidFill>
-                  <a:schemeClr val="accent1"/>
-                </a:solidFill>
-                <a:latin typeface="Blackadder ITC" panose="04020505051007020D02" pitchFamily="82" charset="0"/>
-              </a:rPr>
-              <a:t>Questions ?</a:t>
-            </a:r>
-            <a:endParaRPr lang="en-US" sz="9600" dirty="0">
-              <a:solidFill>
-                <a:schemeClr val="accent1"/>
-              </a:solidFill>
-            </a:endParaRPr>
-          </a:p>
-        </p:txBody>
-      </p:sp>
-    </p:spTree>
-    <p:extLst>
-      <p:ext uri="{BB962C8B-B14F-4D97-AF65-F5344CB8AC3E}">
-        <p14:creationId xmlns:p14="http://schemas.microsoft.com/office/powerpoint/2010/main" val="1748486661"/>
-      </p:ext>
-    </p:extLst>
-  </p:cSld>
-  <p:clrMapOvr>
-    <a:masterClrMapping/>
-  </p:clrMapOvr>
-  <mc:AlternateContent xmlns:mc="http://schemas.openxmlformats.org/markup-compatibility/2006" xmlns:p14="http://schemas.microsoft.com/office/powerpoint/2010/main">
-    <mc:Choice Requires="p14">
-      <p:transition spd="med" p14:dur="700">
-        <p:fade/>
-      </p:transition>
-    </mc:Choice>
-    <mc:Fallback xmlns="">
-      <p:transition spd="med">
-        <p:fade/>
-      </p:transition>
-    </mc:Fallback>
-  </mc:AlternateContent>
-</p:sld>
-</file>
-
-<file path=ppt/slides/slide29.xml><?xml version="1.0" encoding="utf-8"?>
-<p:sld xmlns:a="http://schemas.openxmlformats.org/drawingml/2006/main" xmlns:r="http://schemas.openxmlformats.org/officeDocument/2006/relationships" xmlns:p="http://schemas.openxmlformats.org/presentationml/2006/main">
-  <p:cSld>
-    <p:spTree>
-      <p:nvGrpSpPr>
-        <p:cNvPr id="1" name=""/>
-        <p:cNvGrpSpPr/>
-        <p:nvPr/>
-      </p:nvGrpSpPr>
-      <p:grpSpPr>
-        <a:xfrm>
-          <a:off x="0" y="0"/>
-          <a:ext cx="0" cy="0"/>
-          <a:chOff x="0" y="0"/>
-          <a:chExt cx="0" cy="0"/>
-        </a:xfrm>
-      </p:grpSpPr>
-      <p:sp>
-        <p:nvSpPr>
-          <p:cNvPr id="5" name="Rectangle 4">
-            <a:extLst>
-              <a:ext uri="{FF2B5EF4-FFF2-40B4-BE49-F238E27FC236}">
-                <a16:creationId xmlns:a16="http://schemas.microsoft.com/office/drawing/2014/main" id="{86F37EA8-E346-44D3-9BCA-9003A76D1BAA}"/>
-              </a:ext>
-            </a:extLst>
-          </p:cNvPr>
-          <p:cNvSpPr/>
-          <p:nvPr/>
-        </p:nvSpPr>
-        <p:spPr>
-          <a:xfrm>
-            <a:off x="2208212" y="2644170"/>
-            <a:ext cx="7558498" cy="1569660"/>
-          </a:xfrm>
-          <a:prstGeom prst="rect">
-            <a:avLst/>
-          </a:prstGeom>
-        </p:spPr>
-        <p:txBody>
-          <a:bodyPr wrap="square">
-            <a:spAutoFit/>
-          </a:bodyPr>
-          <a:lstStyle/>
-          <a:p>
-            <a:r>
-              <a:rPr lang="en-US" sz="9600" dirty="0">
-                <a:solidFill>
-                  <a:schemeClr val="accent1"/>
-                </a:solidFill>
-                <a:latin typeface="Blackadder ITC" panose="04020505051007020D02" pitchFamily="82" charset="0"/>
-              </a:rPr>
-              <a:t>Thank You </a:t>
-            </a:r>
-            <a:r>
-              <a:rPr lang="en-US" sz="9600" dirty="0">
-                <a:solidFill>
-                  <a:schemeClr val="accent1"/>
-                </a:solidFill>
-                <a:latin typeface="Blackadder ITC" panose="04020505051007020D02" pitchFamily="82" charset="0"/>
-                <a:sym typeface="Wingdings" panose="05000000000000000000" pitchFamily="2" charset="2"/>
-              </a:rPr>
-              <a:t></a:t>
-            </a:r>
-            <a:endParaRPr lang="en-US" sz="9600" dirty="0">
-              <a:solidFill>
-                <a:schemeClr val="accent1"/>
-              </a:solidFill>
-            </a:endParaRPr>
-          </a:p>
-        </p:txBody>
-      </p:sp>
-    </p:spTree>
-    <p:extLst>
-      <p:ext uri="{BB962C8B-B14F-4D97-AF65-F5344CB8AC3E}">
-        <p14:creationId xmlns:p14="http://schemas.microsoft.com/office/powerpoint/2010/main" val="3239199777"/>
-      </p:ext>
-    </p:extLst>
-  </p:cSld>
-  <p:clrMapOvr>
-    <a:masterClrMapping/>
-  </p:clrMapOvr>
-  <mc:AlternateContent xmlns:mc="http://schemas.openxmlformats.org/markup-compatibility/2006" xmlns:p14="http://schemas.microsoft.com/office/powerpoint/2010/main">
-    <mc:Choice Requires="p14">
-      <p:transition spd="med" p14:dur="700">
-        <p:fade/>
-      </p:transition>
-    </mc:Choice>
-    <mc:Fallback xmlns="">
-      <p:transition spd="med">
-        <p:fade/>
-      </p:transition>
-    </mc:Fallback>
-  </mc:AlternateContent>
-</p:sld>
-</file>
-
 <file path=ppt/slides/slide3.xml><?xml version="1.0" encoding="utf-8"?>
 <p:sld xmlns:a="http://schemas.openxmlformats.org/drawingml/2006/main" xmlns:r="http://schemas.openxmlformats.org/officeDocument/2006/relationships" xmlns:p="http://schemas.openxmlformats.org/presentationml/2006/main">
   <p:cSld>
@@ -32569,6 +33344,188 @@
     <p:extLst>
       <p:ext uri="{BB962C8B-B14F-4D97-AF65-F5344CB8AC3E}">
         <p14:creationId xmlns:p14="http://schemas.microsoft.com/office/powerpoint/2010/main" val="1454269555"/>
+      </p:ext>
+    </p:extLst>
+  </p:cSld>
+  <p:clrMapOvr>
+    <a:masterClrMapping/>
+  </p:clrMapOvr>
+  <mc:AlternateContent xmlns:mc="http://schemas.openxmlformats.org/markup-compatibility/2006" xmlns:p14="http://schemas.microsoft.com/office/powerpoint/2010/main">
+    <mc:Choice Requires="p14">
+      <p:transition spd="med" p14:dur="700">
+        <p:fade/>
+      </p:transition>
+    </mc:Choice>
+    <mc:Fallback xmlns="">
+      <p:transition spd="med">
+        <p:fade/>
+      </p:transition>
+    </mc:Fallback>
+  </mc:AlternateContent>
+</p:sld>
+</file>
+
+<file path=ppt/slides/slide30.xml><?xml version="1.0" encoding="utf-8"?>
+<p:sld xmlns:a="http://schemas.openxmlformats.org/drawingml/2006/main" xmlns:r="http://schemas.openxmlformats.org/officeDocument/2006/relationships" xmlns:p="http://schemas.openxmlformats.org/presentationml/2006/main">
+  <p:cSld>
+    <p:spTree>
+      <p:nvGrpSpPr>
+        <p:cNvPr id="1" name=""/>
+        <p:cNvGrpSpPr/>
+        <p:nvPr/>
+      </p:nvGrpSpPr>
+      <p:grpSpPr>
+        <a:xfrm>
+          <a:off x="0" y="0"/>
+          <a:ext cx="0" cy="0"/>
+          <a:chOff x="0" y="0"/>
+          <a:chExt cx="0" cy="0"/>
+        </a:xfrm>
+      </p:grpSpPr>
+      <p:sp>
+        <p:nvSpPr>
+          <p:cNvPr id="5" name="Rectangle 4">
+            <a:extLst>
+              <a:ext uri="{FF2B5EF4-FFF2-40B4-BE49-F238E27FC236}">
+                <a16:creationId xmlns:a16="http://schemas.microsoft.com/office/drawing/2014/main" id="{86F37EA8-E346-44D3-9BCA-9003A76D1BAA}"/>
+              </a:ext>
+            </a:extLst>
+          </p:cNvPr>
+          <p:cNvSpPr/>
+          <p:nvPr/>
+        </p:nvSpPr>
+        <p:spPr>
+          <a:xfrm>
+            <a:off x="2208212" y="2644170"/>
+            <a:ext cx="7558498" cy="1569660"/>
+          </a:xfrm>
+          <a:prstGeom prst="rect">
+            <a:avLst/>
+          </a:prstGeom>
+        </p:spPr>
+        <p:txBody>
+          <a:bodyPr wrap="square">
+            <a:spAutoFit/>
+          </a:bodyPr>
+          <a:lstStyle/>
+          <a:p>
+            <a:r>
+              <a:rPr lang="en-US" sz="9600" dirty="0">
+                <a:solidFill>
+                  <a:schemeClr val="accent1"/>
+                </a:solidFill>
+                <a:latin typeface="Blackadder ITC" panose="04020505051007020D02" pitchFamily="82" charset="0"/>
+              </a:rPr>
+              <a:t>Questions ?</a:t>
+            </a:r>
+            <a:endParaRPr lang="en-US" sz="9600" dirty="0">
+              <a:solidFill>
+                <a:schemeClr val="accent1"/>
+              </a:solidFill>
+            </a:endParaRPr>
+          </a:p>
+        </p:txBody>
+      </p:sp>
+    </p:spTree>
+    <p:extLst>
+      <p:ext uri="{BB962C8B-B14F-4D97-AF65-F5344CB8AC3E}">
+        <p14:creationId xmlns:p14="http://schemas.microsoft.com/office/powerpoint/2010/main" val="1748486661"/>
+      </p:ext>
+    </p:extLst>
+  </p:cSld>
+  <p:clrMapOvr>
+    <a:masterClrMapping/>
+  </p:clrMapOvr>
+  <mc:AlternateContent xmlns:mc="http://schemas.openxmlformats.org/markup-compatibility/2006" xmlns:p14="http://schemas.microsoft.com/office/powerpoint/2010/main">
+    <mc:Choice Requires="p14">
+      <p:transition spd="med" p14:dur="700">
+        <p:fade/>
+      </p:transition>
+    </mc:Choice>
+    <mc:Fallback xmlns="">
+      <p:transition spd="med">
+        <p:fade/>
+      </p:transition>
+    </mc:Fallback>
+  </mc:AlternateContent>
+</p:sld>
+</file>
+
+<file path=ppt/slides/slide31.xml><?xml version="1.0" encoding="utf-8"?>
+<p:sld xmlns:a="http://schemas.openxmlformats.org/drawingml/2006/main" xmlns:r="http://schemas.openxmlformats.org/officeDocument/2006/relationships" xmlns:p="http://schemas.openxmlformats.org/presentationml/2006/main">
+  <p:cSld>
+    <p:spTree>
+      <p:nvGrpSpPr>
+        <p:cNvPr id="1" name=""/>
+        <p:cNvGrpSpPr/>
+        <p:nvPr/>
+      </p:nvGrpSpPr>
+      <p:grpSpPr>
+        <a:xfrm>
+          <a:off x="0" y="0"/>
+          <a:ext cx="0" cy="0"/>
+          <a:chOff x="0" y="0"/>
+          <a:chExt cx="0" cy="0"/>
+        </a:xfrm>
+      </p:grpSpPr>
+      <p:sp>
+        <p:nvSpPr>
+          <p:cNvPr id="5" name="Rectangle 4">
+            <a:extLst>
+              <a:ext uri="{FF2B5EF4-FFF2-40B4-BE49-F238E27FC236}">
+                <a16:creationId xmlns:a16="http://schemas.microsoft.com/office/drawing/2014/main" id="{86F37EA8-E346-44D3-9BCA-9003A76D1BAA}"/>
+              </a:ext>
+            </a:extLst>
+          </p:cNvPr>
+          <p:cNvSpPr/>
+          <p:nvPr/>
+        </p:nvSpPr>
+        <p:spPr>
+          <a:xfrm>
+            <a:off x="2208212" y="2644170"/>
+            <a:ext cx="7558498" cy="1569660"/>
+          </a:xfrm>
+          <a:prstGeom prst="rect">
+            <a:avLst/>
+          </a:prstGeom>
+        </p:spPr>
+        <p:txBody>
+          <a:bodyPr wrap="square">
+            <a:spAutoFit/>
+          </a:bodyPr>
+          <a:lstStyle/>
+          <a:p>
+            <a:r>
+              <a:rPr lang="en-US" sz="9600" dirty="0">
+                <a:solidFill>
+                  <a:schemeClr val="accent1"/>
+                </a:solidFill>
+                <a:latin typeface="Blackadder ITC" panose="04020505051007020D02" pitchFamily="82" charset="0"/>
+              </a:rPr>
+              <a:t>Thank You </a:t>
+            </a:r>
+            <a:r>
+              <a:rPr lang="en-US" sz="9600" dirty="0">
+                <a:solidFill>
+                  <a:schemeClr val="accent1"/>
+                </a:solidFill>
+                <a:latin typeface="Blackadder ITC" panose="04020505051007020D02" pitchFamily="82" charset="0"/>
+                <a:sym typeface="Wingdings" panose="05000000000000000000" pitchFamily="2" charset="2"/>
+              </a:rPr>
+              <a:t></a:t>
+            </a:r>
+            <a:endParaRPr lang="en-US" sz="9600" dirty="0">
+              <a:solidFill>
+                <a:schemeClr val="accent1"/>
+              </a:solidFill>
+            </a:endParaRPr>
+          </a:p>
+        </p:txBody>
+      </p:sp>
+    </p:spTree>
+    <p:extLst>
+      <p:ext uri="{BB962C8B-B14F-4D97-AF65-F5344CB8AC3E}">
+        <p14:creationId xmlns:p14="http://schemas.microsoft.com/office/powerpoint/2010/main" val="3239199777"/>
       </p:ext>
     </p:extLst>
   </p:cSld>
@@ -39715,6 +40672,15 @@
 </file>
 
 <file path=customXml/item1.xml><?xml version="1.0" encoding="utf-8"?>
+<?mso-contentType ?>
+<FormTemplates xmlns="http://schemas.microsoft.com/sharepoint/v3/contenttype/forms">
+  <Display>DocumentLibraryForm</Display>
+  <Edit>AssetEditForm</Edit>
+  <New>DocumentLibraryForm</New>
+</FormTemplates>
+</file>
+
+<file path=customXml/item2.xml><?xml version="1.0" encoding="utf-8"?>
 <p:properties xmlns:p="http://schemas.microsoft.com/office/2006/metadata/properties" xmlns:xsi="http://www.w3.org/2001/XMLSchema-instance" xmlns:pc="http://schemas.microsoft.com/office/infopath/2007/PartnerControls">
   <documentManagement>
     <LocPublishedLinkedAssetsLookup xmlns="4873beb7-5857-4685-be1f-d57550cc96cc" xsi:nil="true"/>
@@ -39848,15 +40814,6 @@
     <LocMarketGroupTiers2 xmlns="4873beb7-5857-4685-be1f-d57550cc96cc" xsi:nil="true"/>
   </documentManagement>
 </p:properties>
-</file>
-
-<file path=customXml/item2.xml><?xml version="1.0" encoding="utf-8"?>
-<?mso-contentType ?>
-<FormTemplates xmlns="http://schemas.microsoft.com/sharepoint/v3/contenttype/forms">
-  <Display>DocumentLibraryForm</Display>
-  <Edit>AssetEditForm</Edit>
-  <New>DocumentLibraryForm</New>
-</FormTemplates>
 </file>
 
 <file path=customXml/item3.xml><?xml version="1.0" encoding="utf-8"?>
@@ -40900,6 +41857,14 @@
 </file>
 
 <file path=customXml/itemProps1.xml><?xml version="1.0" encoding="utf-8"?>
+<ds:datastoreItem xmlns:ds="http://schemas.openxmlformats.org/officeDocument/2006/customXml" ds:itemID="{E1B558C7-619B-49BE-9097-7FCBDADD4ECE}">
+  <ds:schemaRefs>
+    <ds:schemaRef ds:uri="http://schemas.microsoft.com/sharepoint/v3/contenttype/forms"/>
+  </ds:schemaRefs>
+</ds:datastoreItem>
+</file>
+
+<file path=customXml/itemProps2.xml><?xml version="1.0" encoding="utf-8"?>
 <ds:datastoreItem xmlns:ds="http://schemas.openxmlformats.org/officeDocument/2006/customXml" ds:itemID="{F301D382-32B0-43EE-932C-28906AF37617}">
   <ds:schemaRefs>
     <ds:schemaRef ds:uri="http://schemas.microsoft.com/office/2006/metadata/properties"/>
@@ -40911,14 +41876,6 @@
     <ds:schemaRef ds:uri="4873beb7-5857-4685-be1f-d57550cc96cc"/>
     <ds:schemaRef ds:uri="http://www.w3.org/XML/1998/namespace"/>
     <ds:schemaRef ds:uri="http://purl.org/dc/dcmitype/"/>
-  </ds:schemaRefs>
-</ds:datastoreItem>
-</file>
-
-<file path=customXml/itemProps2.xml><?xml version="1.0" encoding="utf-8"?>
-<ds:datastoreItem xmlns:ds="http://schemas.openxmlformats.org/officeDocument/2006/customXml" ds:itemID="{E1B558C7-619B-49BE-9097-7FCBDADD4ECE}">
-  <ds:schemaRefs>
-    <ds:schemaRef ds:uri="http://schemas.microsoft.com/sharepoint/v3/contenttype/forms"/>
   </ds:schemaRefs>
 </ds:datastoreItem>
 </file>

</xml_diff>